<commit_message>
add first version for arc-42 template
</commit_message>
<xml_diff>
--- a/Themenvorschlag-M&M-v004.pptx
+++ b/Themenvorschlag-M&M-v004.pptx
@@ -295,7 +295,7 @@
           <a:p>
             <a:fld id="{7AF3FCCA-35CB-4317-AD2D-0EF6E5142817}" type="datetimeFigureOut">
               <a:rPr lang="de-DE" smtClean="0"/>
-              <a:t>28.01.2025</a:t>
+              <a:t>24.02.2025</a:t>
             </a:fld>
             <a:endParaRPr lang="de-DE"/>
           </a:p>
@@ -1289,7 +1289,7 @@
             <a:fld id="{2FCB5C92-5ED5-B843-8E0E-A263F53BC698}" type="datetime1">
               <a:rPr lang="de-DE" smtClean="0"/>
               <a:pPr/>
-              <a:t>28.01.2025</a:t>
+              <a:t>24.02.2025</a:t>
             </a:fld>
             <a:endParaRPr lang="de-DE" dirty="0"/>
           </a:p>
@@ -1835,7 +1835,7 @@
             <a:fld id="{2FCB5C92-5ED5-B843-8E0E-A263F53BC698}" type="datetime1">
               <a:rPr lang="de-DE" smtClean="0"/>
               <a:pPr/>
-              <a:t>28.01.2025</a:t>
+              <a:t>24.02.2025</a:t>
             </a:fld>
             <a:endParaRPr lang="de-DE" dirty="0"/>
           </a:p>
@@ -2362,7 +2362,7 @@
             <a:fld id="{2FCB5C92-5ED5-B843-8E0E-A263F53BC698}" type="datetime1">
               <a:rPr lang="de-DE" smtClean="0"/>
               <a:pPr/>
-              <a:t>28.01.2025</a:t>
+              <a:t>24.02.2025</a:t>
             </a:fld>
             <a:endParaRPr lang="de-DE" dirty="0"/>
           </a:p>
@@ -2761,7 +2761,7 @@
             <a:fld id="{2FCB5C92-5ED5-B843-8E0E-A263F53BC698}" type="datetime1">
               <a:rPr lang="de-DE" smtClean="0"/>
               <a:pPr/>
-              <a:t>28.01.2025</a:t>
+              <a:t>24.02.2025</a:t>
             </a:fld>
             <a:endParaRPr lang="de-DE" dirty="0"/>
           </a:p>
@@ -3006,7 +3006,7 @@
             <a:fld id="{2FCB5C92-5ED5-B843-8E0E-A263F53BC698}" type="datetime1">
               <a:rPr lang="de-DE" smtClean="0"/>
               <a:pPr/>
-              <a:t>28.01.2025</a:t>
+              <a:t>24.02.2025</a:t>
             </a:fld>
             <a:endParaRPr lang="de-DE" dirty="0"/>
           </a:p>
@@ -3442,7 +3442,7 @@
             <a:fld id="{2FCB5C92-5ED5-B843-8E0E-A263F53BC698}" type="datetime1">
               <a:rPr lang="de-DE" smtClean="0"/>
               <a:pPr/>
-              <a:t>28.01.2025</a:t>
+              <a:t>24.02.2025</a:t>
             </a:fld>
             <a:endParaRPr lang="de-DE" dirty="0"/>
           </a:p>
@@ -4396,7 +4396,7 @@
         <p:spPr>
           <a:xfrm>
             <a:off x="6269808" y="1261481"/>
-            <a:ext cx="5692097" cy="3970318"/>
+            <a:ext cx="5692097" cy="3323987"/>
           </a:xfrm>
           <a:prstGeom prst="rect">
             <a:avLst/>
@@ -4431,7 +4431,7 @@
                 <a:latin typeface="Arial"/>
                 <a:cs typeface="Arial"/>
               </a:rPr>
-              <a:t>Ist-Zustand der Funktionalität der Software, Keine Ist-Zustand Architektur vorhanden</a:t>
+              <a:t>keine Ist-Zustand-Software oder Architektur</a:t>
             </a:r>
           </a:p>
           <a:p>
@@ -4457,7 +4457,7 @@
                 <a:latin typeface="Arial"/>
                 <a:cs typeface="Arial"/>
               </a:rPr>
-              <a:t>Ist-Architektur erstellen mit Abdeckung kompletter Funktionalität des Status-Quo der Quiz-App</a:t>
+              <a:t>Soll-Architektur erstellen</a:t>
             </a:r>
           </a:p>
           <a:p>
@@ -4470,8 +4470,19 @@
                 <a:latin typeface="Arial"/>
                 <a:cs typeface="Arial"/>
               </a:rPr>
-              <a:t>Soll-Architektur erstellen, ergänzt um Ansicht zum Erstellen von Quizzen sowie Skalierbarkeitsfaktor</a:t>
-            </a:r>
+              <a:t>Quiz-App: inklusive Ansichten, Skalierbarkeit und Keep-</a:t>
+            </a:r>
+            <a:r>
+              <a:rPr lang="de-DE" sz="1400" dirty="0" err="1">
+                <a:latin typeface="Arial"/>
+                <a:cs typeface="Arial"/>
+              </a:rPr>
+              <a:t>Alive</a:t>
+            </a:r>
+            <a:endParaRPr lang="de-DE" sz="1400" dirty="0">
+              <a:latin typeface="Arial"/>
+              <a:cs typeface="Arial"/>
+            </a:endParaRPr>
           </a:p>
           <a:p>
             <a:pPr marL="742950" lvl="1" indent="-285750">
@@ -4483,7 +4494,7 @@
                 <a:latin typeface="Arial"/>
                 <a:cs typeface="Arial"/>
               </a:rPr>
-              <a:t>Skalierbarkeit: Modularität der Instanzen ist so zu gewährleisten, dass eine unabhängige Skalierung von „Quiz spielen“, „Quiz erstellen“ und Authentifizierungs-Logik sowie deren zugehörige Backend-Logik möglich ist</a:t>
+              <a:t>Skalierbarkeit: Modularität der Instanzen ist so zu gewährleisten, dass eine unabhängige Skalierung von „Quiz spielen“, „Quiz erstellen“ und Authentifizierung mit deren zugehörigen Backend-Logiken möglich ist</a:t>
             </a:r>
           </a:p>
           <a:p>
@@ -4496,7 +4507,7 @@
                 <a:latin typeface="Arial"/>
                 <a:cs typeface="Arial"/>
               </a:rPr>
-              <a:t>Modularität: Es soll keine Abhängigkeiten von anderen Instanzen geben. Backend-Logik, auf die mehrere Frontend-Instanzen zugreifen, soll in eigene Backend-Instanz ausgelagert werden.</a:t>
+              <a:t>Modularität: Es soll keine Abhängigkeiten von anderen Instanzen geben. Backend-Logiken, die von mehreren Frontend-Logiken verwendet werden, sollen in eigene Backend-Instanz ausgelagert werden.</a:t>
             </a:r>
           </a:p>
           <a:p>
@@ -4542,7 +4553,7 @@
         <p:spPr>
           <a:xfrm>
             <a:off x="454937" y="1975334"/>
-            <a:ext cx="5630430" cy="6986528"/>
+            <a:ext cx="5510369" cy="4832092"/>
           </a:xfrm>
           <a:prstGeom prst="rect">
             <a:avLst/>
@@ -4607,94 +4618,7 @@
             </a:r>
           </a:p>
           <a:p>
-            <a:pPr algn="l" rtl="0" fontAlgn="base"/>
-            <a:r>
-              <a:rPr lang="de-DE" sz="1400" b="1" kern="1200" dirty="0">
-                <a:solidFill>
-                  <a:srgbClr val="000000"/>
-                </a:solidFill>
-                <a:effectLst/>
-                <a:latin typeface="Arial" panose="020B0604020202020204" pitchFamily="34" charset="0"/>
-                <a:ea typeface="+mn-ea"/>
-                <a:cs typeface="Arial" panose="020B0604020202020204" pitchFamily="34" charset="0"/>
-              </a:rPr>
-              <a:t>Komplexität</a:t>
-            </a:r>
-            <a:endParaRPr lang="de-DE" sz="1400" dirty="0">
-              <a:effectLst/>
-            </a:endParaRPr>
-          </a:p>
-          <a:p>
-            <a:pPr marL="285750" indent="-285750" algn="l" rtl="0" fontAlgn="base">
-              <a:buFontTx/>
-              <a:buChar char="-"/>
-            </a:pPr>
-            <a:r>
-              <a:rPr lang="de-DE" sz="1400" dirty="0">
-                <a:solidFill>
-                  <a:srgbClr val="000000"/>
-                </a:solidFill>
-                <a:latin typeface="Arial" panose="020B0604020202020204" pitchFamily="34" charset="0"/>
-                <a:cs typeface="Arial" panose="020B0604020202020204" pitchFamily="34" charset="0"/>
-              </a:rPr>
-              <a:t>5000</a:t>
-            </a:r>
-            <a:r>
-              <a:rPr lang="de-DE" sz="1400" kern="1200" dirty="0">
-                <a:solidFill>
-                  <a:srgbClr val="000000"/>
-                </a:solidFill>
-                <a:effectLst/>
-                <a:latin typeface="Arial" panose="020B0604020202020204" pitchFamily="34" charset="0"/>
-                <a:ea typeface="+mn-ea"/>
-                <a:cs typeface="Arial" panose="020B0604020202020204" pitchFamily="34" charset="0"/>
-              </a:rPr>
-              <a:t> Lines </a:t>
-            </a:r>
-            <a:r>
-              <a:rPr lang="de-DE" sz="1400" kern="1200" dirty="0" err="1">
-                <a:solidFill>
-                  <a:srgbClr val="000000"/>
-                </a:solidFill>
-                <a:effectLst/>
-                <a:latin typeface="Arial" panose="020B0604020202020204" pitchFamily="34" charset="0"/>
-                <a:ea typeface="+mn-ea"/>
-                <a:cs typeface="Arial" panose="020B0604020202020204" pitchFamily="34" charset="0"/>
-              </a:rPr>
-              <a:t>of</a:t>
-            </a:r>
-            <a:r>
-              <a:rPr lang="de-DE" sz="1400" kern="1200" dirty="0">
-                <a:solidFill>
-                  <a:srgbClr val="000000"/>
-                </a:solidFill>
-                <a:effectLst/>
-                <a:latin typeface="Arial" panose="020B0604020202020204" pitchFamily="34" charset="0"/>
-                <a:ea typeface="+mn-ea"/>
-                <a:cs typeface="Arial" panose="020B0604020202020204" pitchFamily="34" charset="0"/>
-              </a:rPr>
-              <a:t> Code</a:t>
-            </a:r>
-            <a:endParaRPr lang="de-DE" sz="1400" dirty="0"/>
-          </a:p>
-          <a:p>
-            <a:pPr marL="285750" indent="-285750" algn="l" rtl="0" fontAlgn="base">
-              <a:buFontTx/>
-              <a:buChar char="-"/>
-            </a:pPr>
-            <a:r>
-              <a:rPr lang="de-DE" sz="1400" kern="1200" dirty="0">
-                <a:solidFill>
-                  <a:srgbClr val="000000"/>
-                </a:solidFill>
-                <a:effectLst/>
-                <a:latin typeface="Arial" panose="020B0604020202020204" pitchFamily="34" charset="0"/>
-                <a:ea typeface="+mn-ea"/>
-                <a:cs typeface="Arial" panose="020B0604020202020204" pitchFamily="34" charset="0"/>
-              </a:rPr>
-              <a:t>Funktionale App, keine Softwarearchitektur-Dokumentation</a:t>
-            </a:r>
-            <a:endParaRPr lang="de-DE" sz="1400" dirty="0">
+            <a:endParaRPr lang="de-DE" sz="1400" b="1" dirty="0">
               <a:latin typeface="Arial"/>
               <a:cs typeface="Arial"/>
             </a:endParaRPr>
@@ -4709,12 +4633,16 @@
             </a:r>
           </a:p>
           <a:p>
+            <a:pPr marL="285750" indent="-285750">
+              <a:buFontTx/>
+              <a:buChar char="-"/>
+            </a:pPr>
             <a:r>
               <a:rPr lang="de-DE" sz="1400" b="1" dirty="0">
                 <a:latin typeface="Arial"/>
                 <a:cs typeface="Arial"/>
               </a:rPr>
-              <a:t>-     Ist: </a:t>
+              <a:t>Ist: </a:t>
             </a:r>
           </a:p>
           <a:p>
@@ -4727,7 +4655,24 @@
                 <a:latin typeface="Arial"/>
                 <a:cs typeface="Arial"/>
               </a:rPr>
-              <a:t>Quiz-App, ausgelegt auf Spielen von vordefinierten Quizzen</a:t>
+              <a:t>kein vorhandener Ist-Zustand</a:t>
+            </a:r>
+            <a:endParaRPr lang="de-DE" sz="1400" b="1" dirty="0">
+              <a:latin typeface="Arial"/>
+              <a:cs typeface="Arial"/>
+            </a:endParaRPr>
+          </a:p>
+          <a:p>
+            <a:pPr marL="285750" indent="-285750">
+              <a:buFontTx/>
+              <a:buChar char="-"/>
+            </a:pPr>
+            <a:r>
+              <a:rPr lang="de-DE" sz="1400" b="1" dirty="0">
+                <a:latin typeface="Arial"/>
+                <a:cs typeface="Arial"/>
+              </a:rPr>
+              <a:t>Soll: </a:t>
             </a:r>
           </a:p>
           <a:p>
@@ -4740,7 +4685,7 @@
                 <a:latin typeface="Arial"/>
                 <a:cs typeface="Arial"/>
               </a:rPr>
-              <a:t>Quizze beinhalten ausschließlich eine Standard-Ansicht, ohne eigenes Präsentationsstil</a:t>
+              <a:t>Quiz-App, ausgelegt zum Spielen von nutzererstellten Quizzen mit anderen Nutzern (ein Host, mehrere Spieler)</a:t>
             </a:r>
           </a:p>
           <a:p>
@@ -4753,7 +4698,67 @@
                 <a:latin typeface="Arial"/>
                 <a:cs typeface="Arial"/>
               </a:rPr>
-              <a:t>Ist-Zustand Tech-Stack:</a:t>
+              <a:t>Spieler und Host sollen möglichst synchron durch die Fragen der Quizze geführt werden, Anwendung muss skalierbar sein (50 Spieler in Quiz handhabbar)</a:t>
+            </a:r>
+          </a:p>
+          <a:p>
+            <a:pPr marL="742950" lvl="1" indent="-285750">
+              <a:buFontTx/>
+              <a:buChar char="-"/>
+            </a:pPr>
+            <a:r>
+              <a:rPr lang="de-DE" sz="1400" dirty="0">
+                <a:latin typeface="Arial"/>
+                <a:cs typeface="Arial"/>
+              </a:rPr>
+              <a:t>Antworten für Fragen sollen verarbeitet, Punkte vergeben und eine Rangliste am Ende ausgeben werden</a:t>
+            </a:r>
+          </a:p>
+          <a:p>
+            <a:pPr marL="742950" lvl="1" indent="-285750">
+              <a:buFontTx/>
+              <a:buChar char="-"/>
+            </a:pPr>
+            <a:r>
+              <a:rPr lang="de-DE" sz="1400" dirty="0" err="1">
+                <a:latin typeface="Arial"/>
+                <a:cs typeface="Arial"/>
+              </a:rPr>
+              <a:t>keep</a:t>
+            </a:r>
+            <a:r>
+              <a:rPr lang="de-DE" sz="1400" dirty="0">
+                <a:latin typeface="Arial"/>
+                <a:cs typeface="Arial"/>
+              </a:rPr>
+              <a:t>-</a:t>
+            </a:r>
+            <a:r>
+              <a:rPr lang="de-DE" sz="1400" dirty="0" err="1">
+                <a:latin typeface="Arial"/>
+                <a:cs typeface="Arial"/>
+              </a:rPr>
+              <a:t>alive</a:t>
+            </a:r>
+            <a:r>
+              <a:rPr lang="de-DE" sz="1400" dirty="0">
+                <a:latin typeface="Arial"/>
+                <a:cs typeface="Arial"/>
+              </a:rPr>
+              <a:t>-System für Spieler und Hosts</a:t>
+            </a:r>
+          </a:p>
+          <a:p>
+            <a:pPr marL="742950" lvl="1" indent="-285750">
+              <a:buFontTx/>
+              <a:buChar char="-"/>
+            </a:pPr>
+            <a:r>
+              <a:rPr lang="de-DE" sz="1400" dirty="0">
+                <a:latin typeface="Arial"/>
+                <a:cs typeface="Arial"/>
+              </a:rPr>
+              <a:t>Tech-Stack:</a:t>
             </a:r>
           </a:p>
           <a:p>
@@ -4766,7 +4771,7 @@
                 <a:latin typeface="Arial"/>
                 <a:cs typeface="Arial"/>
               </a:rPr>
-              <a:t>Next.js (einzige Instanz, die Frontend- und Backend-Logik vereint, inklusive Nutzer-Authentifizierung)</a:t>
+              <a:t>Vue.js Frontend (mehrere Instanzen für unterschiedliche Teile der Geschäftslogik)</a:t>
             </a:r>
           </a:p>
           <a:p>
@@ -4779,92 +4784,7 @@
                 <a:latin typeface="Arial"/>
                 <a:cs typeface="Arial"/>
               </a:rPr>
-              <a:t>PostgreSQL-Datenbank (einzige Datenbankinstanz zur Speicherung von Daten, nicht in Normalform)</a:t>
-            </a:r>
-          </a:p>
-          <a:p>
-            <a:pPr marL="1200150" lvl="2" indent="-285750">
-              <a:buFontTx/>
-              <a:buChar char="-"/>
-            </a:pPr>
-            <a:r>
-              <a:rPr lang="de-DE" sz="1400" dirty="0" err="1">
-                <a:latin typeface="Arial"/>
-                <a:cs typeface="Arial"/>
-              </a:rPr>
-              <a:t>WebSockets</a:t>
-            </a:r>
-            <a:r>
-              <a:rPr lang="de-DE" sz="1400" dirty="0">
-                <a:latin typeface="Arial"/>
-                <a:cs typeface="Arial"/>
-              </a:rPr>
-              <a:t> direkt in Next.js für Bidirektionale Kommunikation (limitiert durch Skalierung des Next.js Servers)</a:t>
-            </a:r>
-          </a:p>
-          <a:p>
-            <a:pPr marL="285750" indent="-285750">
-              <a:buFontTx/>
-              <a:buChar char="-"/>
-            </a:pPr>
-            <a:r>
-              <a:rPr lang="de-DE" sz="1400" b="1" dirty="0">
-                <a:latin typeface="Arial"/>
-                <a:cs typeface="Arial"/>
-              </a:rPr>
-              <a:t>Soll:</a:t>
-            </a:r>
-          </a:p>
-          <a:p>
-            <a:pPr marL="742950" lvl="1" indent="-285750">
-              <a:buFontTx/>
-              <a:buChar char="-"/>
-            </a:pPr>
-            <a:r>
-              <a:rPr lang="de-DE" sz="1400" dirty="0">
-                <a:latin typeface="Arial"/>
-                <a:cs typeface="Arial"/>
-              </a:rPr>
-              <a:t>Quiz-App im Ist-Zustand + Quizze mit eigenem Präsentationsstil können bespielt werden</a:t>
-            </a:r>
-          </a:p>
-          <a:p>
-            <a:pPr marL="742950" lvl="1" indent="-285750">
-              <a:buFontTx/>
-              <a:buChar char="-"/>
-            </a:pPr>
-            <a:r>
-              <a:rPr lang="de-DE" sz="1400" dirty="0">
-                <a:latin typeface="Arial"/>
-                <a:cs typeface="Arial"/>
-              </a:rPr>
-              <a:t>Soll-Zustand Tech-Stack:</a:t>
-            </a:r>
-          </a:p>
-          <a:p>
-            <a:pPr marL="1200150" lvl="2" indent="-285750">
-              <a:buFontTx/>
-              <a:buChar char="-"/>
-            </a:pPr>
-            <a:r>
-              <a:rPr lang="de-DE" sz="1400" dirty="0">
-                <a:latin typeface="Arial"/>
-                <a:cs typeface="Arial"/>
-              </a:rPr>
-              <a:t>Next.js (mehrere Instanzen für unterschiedliche Teile der Geschäftslogik)</a:t>
-            </a:r>
-          </a:p>
-          <a:p>
-            <a:pPr marL="1200150" lvl="2" indent="-285750">
-              <a:buFontTx/>
-              <a:buChar char="-"/>
-            </a:pPr>
-            <a:r>
-              <a:rPr lang="de-DE" sz="1400" dirty="0">
-                <a:latin typeface="Arial"/>
-                <a:cs typeface="Arial"/>
-              </a:rPr>
-              <a:t>Backend-Logik + </a:t>
+              <a:t>Backend-Logik mit </a:t>
             </a:r>
             <a:r>
               <a:rPr lang="de-DE" sz="1400" dirty="0" err="1">
@@ -4878,7 +4798,7 @@
                 <a:latin typeface="Arial"/>
                 <a:cs typeface="Arial"/>
               </a:rPr>
-              <a:t> in Microservices ausgegliedert (Unterschiedliche Next.js Instanzen sollen auf gemeinsame Backend-Logik zugreifen können)</a:t>
+              <a:t> in Microservices</a:t>
             </a:r>
           </a:p>
         </p:txBody>
@@ -4897,8 +4817,8 @@
         </p:nvSpPr>
         <p:spPr>
           <a:xfrm>
-            <a:off x="6226696" y="5407681"/>
-            <a:ext cx="5735210" cy="2462213"/>
+            <a:off x="6226695" y="4939848"/>
+            <a:ext cx="5735210" cy="1169551"/>
           </a:xfrm>
           <a:prstGeom prst="rect">
             <a:avLst/>
@@ -4943,46 +4863,7 @@
                 <a:latin typeface="Arial"/>
                 <a:cs typeface="Arial"/>
               </a:rPr>
-              <a:t>Implementation einer neuen Ansicht zum Erstellen von Quizzen, inklusive Nutzer-Authentifizierung</a:t>
-            </a:r>
-          </a:p>
-          <a:p>
-            <a:pPr marL="742950" lvl="1" indent="-285750">
-              <a:buFontTx/>
-              <a:buChar char="-"/>
-            </a:pPr>
-            <a:r>
-              <a:rPr lang="de-DE" sz="1400" dirty="0">
-                <a:latin typeface="Arial"/>
-                <a:cs typeface="Arial"/>
-              </a:rPr>
-              <a:t>Modularität der Komponenten (unterschiedliche Frontend Instanzen müssen auf gleiche Backend-Logik zugreifen)</a:t>
-            </a:r>
-          </a:p>
-          <a:p>
-            <a:pPr marL="742950" lvl="1" indent="-285750">
-              <a:buFontTx/>
-              <a:buChar char="-"/>
-            </a:pPr>
-            <a:r>
-              <a:rPr lang="de-DE" sz="1400" dirty="0">
-                <a:latin typeface="Arial"/>
-                <a:cs typeface="Arial"/>
-              </a:rPr>
               <a:t>Multiuser-Fähigkeit: Gewährleistung Synchronität der Spieler, benötigt Skalierungsmöglichkeit und Modularität der Instanzen</a:t>
-            </a:r>
-          </a:p>
-          <a:p>
-            <a:pPr marL="742950" lvl="1" indent="-285750">
-              <a:buFontTx/>
-              <a:buChar char="-"/>
-            </a:pPr>
-            <a:r>
-              <a:rPr lang="de-DE" sz="1400" dirty="0">
-                <a:latin typeface="Arial"/>
-                <a:cs typeface="Arial"/>
-              </a:rPr>
-              <a:t>Logik zum spielen und erstellen von Quizzen unabhängig skalierbar (in unabhängigen Instanzen)</a:t>
             </a:r>
           </a:p>
         </p:txBody>
@@ -5799,6 +5680,21 @@
 </file>
 
 <file path=customXml/item1.xml><?xml version="1.0" encoding="utf-8"?>
+<?mso-contentType ?>
+<FormTemplates xmlns="http://schemas.microsoft.com/sharepoint/v3/contenttype/forms">
+  <Display>DocumentLibraryForm</Display>
+  <Edit>DocumentLibraryForm</Edit>
+  <New>DocumentLibraryForm</New>
+</FormTemplates>
+</file>
+
+<file path=customXml/item2.xml><?xml version="1.0" encoding="utf-8"?>
+<p:properties xmlns:p="http://schemas.microsoft.com/office/2006/metadata/properties" xmlns:xsi="http://www.w3.org/2001/XMLSchema-instance" xmlns:pc="http://schemas.microsoft.com/office/infopath/2007/PartnerControls">
+  <documentManagement/>
+</p:properties>
+</file>
+
+<file path=customXml/item3.xml><?xml version="1.0" encoding="utf-8"?>
 <ct:contentTypeSchema xmlns:ct="http://schemas.microsoft.com/office/2006/metadata/contentType" xmlns:ma="http://schemas.microsoft.com/office/2006/metadata/properties/metaAttributes" ct:_="" ma:_="" ma:contentTypeName="Dokument" ma:contentTypeID="0x0101005892C6BF04B36544903F91F3380CC83A" ma:contentTypeVersion="4" ma:contentTypeDescription="Ein neues Dokument erstellen." ma:contentTypeScope="" ma:versionID="bc51adfaf96474db4638a713f73b2d65">
   <xsd:schema xmlns:xsd="http://www.w3.org/2001/XMLSchema" xmlns:xs="http://www.w3.org/2001/XMLSchema" xmlns:p="http://schemas.microsoft.com/office/2006/metadata/properties" xmlns:ns2="1d89f91d-338f-43f8-8a98-53a1c3ad3581" targetNamespace="http://schemas.microsoft.com/office/2006/metadata/properties" ma:root="true" ma:fieldsID="744fda781b20b685575f3585e4126831" ns2:_="">
     <xsd:import namespace="1d89f91d-338f-43f8-8a98-53a1c3ad3581"/>
@@ -5942,22 +5838,31 @@
 </ct:contentTypeSchema>
 </file>
 
-<file path=customXml/item2.xml><?xml version="1.0" encoding="utf-8"?>
-<p:properties xmlns:p="http://schemas.microsoft.com/office/2006/metadata/properties" xmlns:xsi="http://www.w3.org/2001/XMLSchema-instance" xmlns:pc="http://schemas.microsoft.com/office/infopath/2007/PartnerControls">
-  <documentManagement/>
-</p:properties>
+<file path=customXml/itemProps1.xml><?xml version="1.0" encoding="utf-8"?>
+<ds:datastoreItem xmlns:ds="http://schemas.openxmlformats.org/officeDocument/2006/customXml" ds:itemID="{2659ABE1-CAED-4787-B4E5-C1F157E34C1C}">
+  <ds:schemaRefs>
+    <ds:schemaRef ds:uri="http://schemas.microsoft.com/sharepoint/v3/contenttype/forms"/>
+  </ds:schemaRefs>
+</ds:datastoreItem>
 </file>
 
-<file path=customXml/item3.xml><?xml version="1.0" encoding="utf-8"?>
-<?mso-contentType ?>
-<FormTemplates xmlns="http://schemas.microsoft.com/sharepoint/v3/contenttype/forms">
-  <Display>DocumentLibraryForm</Display>
-  <Edit>DocumentLibraryForm</Edit>
-  <New>DocumentLibraryForm</New>
-</FormTemplates>
+<file path=customXml/itemProps2.xml><?xml version="1.0" encoding="utf-8"?>
+<ds:datastoreItem xmlns:ds="http://schemas.openxmlformats.org/officeDocument/2006/customXml" ds:itemID="{9CAE7C20-7453-4FA4-BFE0-745E1ACD32E3}">
+  <ds:schemaRefs>
+    <ds:schemaRef ds:uri="http://purl.org/dc/elements/1.1/"/>
+    <ds:schemaRef ds:uri="http://www.w3.org/XML/1998/namespace"/>
+    <ds:schemaRef ds:uri="http://purl.org/dc/terms/"/>
+    <ds:schemaRef ds:uri="http://purl.org/dc/dcmitype/"/>
+    <ds:schemaRef ds:uri="http://schemas.microsoft.com/office/2006/metadata/properties"/>
+    <ds:schemaRef ds:uri="http://schemas.microsoft.com/office/2006/documentManagement/types"/>
+    <ds:schemaRef ds:uri="http://schemas.microsoft.com/office/infopath/2007/PartnerControls"/>
+    <ds:schemaRef ds:uri="http://schemas.openxmlformats.org/package/2006/metadata/core-properties"/>
+    <ds:schemaRef ds:uri="1d89f91d-338f-43f8-8a98-53a1c3ad3581"/>
+  </ds:schemaRefs>
+</ds:datastoreItem>
 </file>
 
-<file path=customXml/itemProps1.xml><?xml version="1.0" encoding="utf-8"?>
+<file path=customXml/itemProps3.xml><?xml version="1.0" encoding="utf-8"?>
 <ds:datastoreItem xmlns:ds="http://schemas.openxmlformats.org/officeDocument/2006/customXml" ds:itemID="{7935C310-2703-47F8-8E9F-D99BD0F090B3}">
   <ds:schemaRefs>
     <ds:schemaRef ds:uri="http://schemas.microsoft.com/office/2006/metadata/contentType"/>
@@ -5973,21 +5878,4 @@
     <ds:schemaRef ds:uri="http://schemas.microsoft.com/internal/obd"/>
   </ds:schemaRefs>
 </ds:datastoreItem>
-</file>
-
-<file path=customXml/itemProps2.xml><?xml version="1.0" encoding="utf-8"?>
-<ds:datastoreItem xmlns:ds="http://schemas.openxmlformats.org/officeDocument/2006/customXml" ds:itemID="{9CAE7C20-7453-4FA4-BFE0-745E1ACD32E3}">
-  <ds:schemaRefs>
-    <ds:schemaRef ds:uri="http://schemas.microsoft.com/office/2006/metadata/properties"/>
-    <ds:schemaRef ds:uri="http://schemas.microsoft.com/office/infopath/2007/PartnerControls"/>
-  </ds:schemaRefs>
-</ds:datastoreItem>
-</file>
-
-<file path=customXml/itemProps3.xml><?xml version="1.0" encoding="utf-8"?>
-<ds:datastoreItem xmlns:ds="http://schemas.openxmlformats.org/officeDocument/2006/customXml" ds:itemID="{2659ABE1-CAED-4787-B4E5-C1F157E34C1C}">
-  <ds:schemaRefs>
-    <ds:schemaRef ds:uri="http://schemas.microsoft.com/sharepoint/v3/contenttype/forms"/>
-  </ds:schemaRefs>
-</ds:datastoreItem>
 </file>
</xml_diff>